<commit_message>
Update to file structure of project
</commit_message>
<xml_diff>
--- a/VIP_Preliminary_Content_Analysis_present.pptx
+++ b/VIP_Preliminary_Content_Analysis_present.pptx
@@ -3200,7 +3200,7 @@
             </a:pPr>
             <a:r>
               <a:rPr/>
-              <a:t>2023-02-13</a:t>
+              <a:t>2023-02-14</a:t>
             </a:r>
           </a:p>
         </p:txBody>
@@ -4841,12 +4841,24 @@
           <a:bodyPr/>
           <a:lstStyle/>
           <a:p>
-            <a:pPr lvl="0" indent="0" marL="0">
-              <a:buNone/>
-            </a:pPr>
-            <a:r>
-              <a:rPr/>
-              <a:t>Latent dirichlet allocation (LDA) is a probabilistic topic model. The LDA assumes that documents can have multiple topics (i.e. a document is a mixture of topics) and that each topic is made up of a distribution of words. The words within one topic can also occur within another topic’s distribution of words.</a:t>
+            <a:pPr lvl="0"/>
+            <a:r>
+              <a:rPr/>
+              <a:t>Latent dirichlet allocation (LDA) is a probabilistic topic model.</a:t>
+            </a:r>
+          </a:p>
+          <a:p>
+            <a:pPr lvl="0"/>
+            <a:r>
+              <a:rPr/>
+              <a:t>The LDA assumes that documents can have multiple topics (i.e. a document is a mixture of topics) and that each topic is made up of a distribution of words.</a:t>
+            </a:r>
+          </a:p>
+          <a:p>
+            <a:pPr lvl="0"/>
+            <a:r>
+              <a:rPr/>
+              <a:t>The words within one topic can also occur within another topic’s distribution of words.</a:t>
             </a:r>
           </a:p>
         </p:txBody>
@@ -4922,30 +4934,44 @@
             </a:r>
           </a:p>
           <a:p>
+            <a:pPr lvl="0"/>
+            <a:r>
+              <a:rPr/>
+              <a:t>a set of topics are generated first</a:t>
+            </a:r>
+          </a:p>
+          <a:p>
             <a:pPr lvl="0" indent="-342900" marL="342900">
               <a:buAutoNum type="arabicPeriod"/>
             </a:pPr>
             <a:r>
               <a:rPr/>
-              <a:t>a set of topics are generated first</a:t>
+              <a:t>the model randomly chooses a distribution over that collection of topics</a:t>
+            </a:r>
+          </a:p>
+          <a:p>
+            <a:pPr lvl="0"/>
+            <a:r>
+              <a:rPr/>
+              <a:t>for each word in the document</a:t>
             </a:r>
           </a:p>
           <a:p>
             <a:pPr lvl="0" indent="-342900" marL="342900">
-              <a:buAutoNum type="arabicPeriod"/>
+              <a:buAutoNum startAt="2" type="arabicPeriod"/>
             </a:pPr>
             <a:r>
               <a:rPr/>
-              <a:t>the model randomly chooses a distribution over that collection of topics</a:t>
+              <a:t>the model will randomly choose a topic from the distribution</a:t>
             </a:r>
           </a:p>
           <a:p>
             <a:pPr lvl="0" indent="-342900" marL="342900">
-              <a:buAutoNum type="arabicPeriod"/>
+              <a:buAutoNum startAt="2" type="arabicPeriod"/>
             </a:pPr>
             <a:r>
               <a:rPr/>
-              <a:t>for each word in the text, the model will randomly choose a topic from the distribution and then randomly choose a word from the distribution of words associated with the chosen topic (Blei, 2003).</a:t>
+              <a:t>then randomly choose a word from the distribution of words associated with the chosen topic (Blei, 2003).</a:t>
             </a:r>
           </a:p>
         </p:txBody>
@@ -6112,7 +6138,7 @@
             </a:pPr>
             <a:r>
               <a:rPr/>
-              <a:t>This results in a one-token-per-row data frame (or one-token-per-document-per-row).</a:t>
+              <a:t>This results in a one-token-per-row data frame.</a:t>
             </a:r>
           </a:p>
           <a:p>

</xml_diff>